<commit_message>
Added animation and GitHub links to PPTX slides
</commit_message>
<xml_diff>
--- a/Courses/Applied-Programmer/Programming-Basics/01-Въведение-в-програмирането/01.Въведение-в-програмирането.pptx
+++ b/Courses/Applied-Programmer/Programming-Basics/01-Въведение-в-програмирането/01.Въведение-в-програмирането.pptx
@@ -311,7 +311,7 @@
             <a:fld id="{FE5B4EDC-59C0-49C7-8ADA-5A781B329E02}" type="datetimeFigureOut">
               <a:rPr lang="en-US"/>
               <a:pPr/>
-              <a:t>16-Dec-19</a:t>
+              <a:t>11-Nov-20</a:t>
             </a:fld>
             <a:endParaRPr dirty="0"/>
           </a:p>
@@ -609,7 +609,7 @@
             <a:fld id="{F2D8D46A-B586-417D-BFBD-8C8FE0AAF762}" type="datetimeFigureOut">
               <a:rPr lang="en-US" smtClean="0"/>
               <a:pPr/>
-              <a:t>16-Dec-19</a:t>
+              <a:t>11-Nov-20</a:t>
             </a:fld>
             <a:endParaRPr lang="en-US" dirty="0"/>
           </a:p>
@@ -3877,7 +3877,7 @@
         </p:blipFill>
         <p:spPr bwMode="auto">
           <a:xfrm>
-            <a:off x="745783" y="4076772"/>
+            <a:off x="766536" y="4363710"/>
             <a:ext cx="2175525" cy="761165"/>
           </a:xfrm>
           <a:prstGeom prst="roundRect">
@@ -3955,7 +3955,7 @@
         </p:nvSpPr>
         <p:spPr>
           <a:xfrm>
-            <a:off x="760413" y="4998598"/>
+            <a:off x="760414" y="5110220"/>
             <a:ext cx="3187614" cy="444343"/>
           </a:xfrm>
         </p:spPr>
@@ -3987,7 +3987,7 @@
         </p:nvSpPr>
         <p:spPr>
           <a:xfrm>
-            <a:off x="760412" y="5403725"/>
+            <a:off x="760414" y="5554563"/>
             <a:ext cx="3187613" cy="382788"/>
           </a:xfrm>
         </p:spPr>
@@ -4015,7 +4015,7 @@
         </p:nvSpPr>
         <p:spPr>
           <a:xfrm>
-            <a:off x="760412" y="5690893"/>
+            <a:off x="745783" y="5920490"/>
             <a:ext cx="3810000" cy="458462"/>
           </a:xfrm>
         </p:spPr>
@@ -4161,6 +4161,44 @@
           </a:prstGeom>
         </p:spPr>
       </p:pic>
+      <p:sp>
+        <p:nvSpPr>
+          <p:cNvPr id="2" name="Текстово поле 1">
+            <a:extLst>
+              <a:ext uri="{FF2B5EF4-FFF2-40B4-BE49-F238E27FC236}">
+                <a16:creationId xmlns:a16="http://schemas.microsoft.com/office/drawing/2014/main" id="{B398007E-9BC4-479A-87BF-1B270134F51F}"/>
+              </a:ext>
+            </a:extLst>
+          </p:cNvPr>
+          <p:cNvSpPr txBox="1"/>
+          <p:nvPr/>
+        </p:nvSpPr>
+        <p:spPr>
+          <a:xfrm>
+            <a:off x="684212" y="6328263"/>
+            <a:ext cx="11216029" cy="369332"/>
+          </a:xfrm>
+          <a:prstGeom prst="rect">
+            <a:avLst/>
+          </a:prstGeom>
+          <a:noFill/>
+        </p:spPr>
+        <p:txBody>
+          <a:bodyPr wrap="square" rtlCol="0">
+            <a:spAutoFit/>
+          </a:bodyPr>
+          <a:lstStyle/>
+          <a:p>
+            <a:r>
+              <a:rPr lang="en-US" sz="1800" b="1" dirty="0">
+                <a:hlinkClick r:id="rId8"/>
+              </a:rPr>
+              <a:t>https://github.com/BG-IT-Edu/School-Programming/tree/main/Courses/Applied-Programmer/Programming-Basics</a:t>
+            </a:r>
+            <a:endParaRPr lang="bg-BG" sz="1800" b="1" dirty="0"/>
+          </a:p>
+        </p:txBody>
+      </p:sp>
     </p:spTree>
     <p:extLst>
       <p:ext uri="{BB962C8B-B14F-4D97-AF65-F5344CB8AC3E}">
@@ -4577,6 +4615,134 @@
   <p:clrMapOvr>
     <a:masterClrMapping/>
   </p:clrMapOvr>
+  <p:timing>
+    <p:tnLst>
+      <p:par>
+        <p:cTn id="1" dur="indefinite" restart="never" nodeType="tmRoot">
+          <p:childTnLst>
+            <p:seq concurrent="1" nextAc="seek">
+              <p:cTn id="2" dur="indefinite" nodeType="mainSeq">
+                <p:childTnLst>
+                  <p:par>
+                    <p:cTn id="3" fill="hold">
+                      <p:stCondLst>
+                        <p:cond delay="indefinite"/>
+                      </p:stCondLst>
+                      <p:childTnLst>
+                        <p:par>
+                          <p:cTn id="4" fill="hold">
+                            <p:stCondLst>
+                              <p:cond delay="0"/>
+                            </p:stCondLst>
+                            <p:childTnLst>
+                              <p:par>
+                                <p:cTn id="5" presetID="1" presetClass="entr" presetSubtype="0" fill="hold" nodeType="clickEffect">
+                                  <p:stCondLst>
+                                    <p:cond delay="0"/>
+                                  </p:stCondLst>
+                                  <p:childTnLst>
+                                    <p:set>
+                                      <p:cBhvr>
+                                        <p:cTn id="6" dur="1" fill="hold">
+                                          <p:stCondLst>
+                                            <p:cond delay="0"/>
+                                          </p:stCondLst>
+                                        </p:cTn>
+                                        <p:tgtEl>
+                                          <p:spTgt spid="5">
+                                            <p:txEl>
+                                              <p:pRg st="1" end="1"/>
+                                            </p:txEl>
+                                          </p:spTgt>
+                                        </p:tgtEl>
+                                        <p:attrNameLst>
+                                          <p:attrName>style.visibility</p:attrName>
+                                        </p:attrNameLst>
+                                      </p:cBhvr>
+                                      <p:to>
+                                        <p:strVal val="visible"/>
+                                      </p:to>
+                                    </p:set>
+                                  </p:childTnLst>
+                                </p:cTn>
+                              </p:par>
+                            </p:childTnLst>
+                          </p:cTn>
+                        </p:par>
+                      </p:childTnLst>
+                    </p:cTn>
+                  </p:par>
+                  <p:par>
+                    <p:cTn id="7" fill="hold">
+                      <p:stCondLst>
+                        <p:cond delay="indefinite"/>
+                      </p:stCondLst>
+                      <p:childTnLst>
+                        <p:par>
+                          <p:cTn id="8" fill="hold">
+                            <p:stCondLst>
+                              <p:cond delay="0"/>
+                            </p:stCondLst>
+                            <p:childTnLst>
+                              <p:par>
+                                <p:cTn id="9" presetID="1" presetClass="entr" presetSubtype="0" fill="hold" nodeType="clickEffect">
+                                  <p:stCondLst>
+                                    <p:cond delay="0"/>
+                                  </p:stCondLst>
+                                  <p:childTnLst>
+                                    <p:set>
+                                      <p:cBhvr>
+                                        <p:cTn id="10" dur="1" fill="hold">
+                                          <p:stCondLst>
+                                            <p:cond delay="0"/>
+                                          </p:stCondLst>
+                                        </p:cTn>
+                                        <p:tgtEl>
+                                          <p:spTgt spid="5">
+                                            <p:txEl>
+                                              <p:pRg st="2" end="2"/>
+                                            </p:txEl>
+                                          </p:spTgt>
+                                        </p:tgtEl>
+                                        <p:attrNameLst>
+                                          <p:attrName>style.visibility</p:attrName>
+                                        </p:attrNameLst>
+                                      </p:cBhvr>
+                                      <p:to>
+                                        <p:strVal val="visible"/>
+                                      </p:to>
+                                    </p:set>
+                                  </p:childTnLst>
+                                </p:cTn>
+                              </p:par>
+                            </p:childTnLst>
+                          </p:cTn>
+                        </p:par>
+                      </p:childTnLst>
+                    </p:cTn>
+                  </p:par>
+                </p:childTnLst>
+              </p:cTn>
+              <p:prevCondLst>
+                <p:cond evt="onPrev" delay="0">
+                  <p:tgtEl>
+                    <p:sldTgt/>
+                  </p:tgtEl>
+                </p:cond>
+              </p:prevCondLst>
+              <p:nextCondLst>
+                <p:cond evt="onNext" delay="0">
+                  <p:tgtEl>
+                    <p:sldTgt/>
+                  </p:tgtEl>
+                </p:cond>
+              </p:nextCondLst>
+            </p:seq>
+          </p:childTnLst>
+        </p:cTn>
+      </p:par>
+    </p:tnLst>
+  </p:timing>
 </p:sld>
 </file>
 
@@ -4622,31 +4788,39 @@
       </p:sp>
       <p:sp>
         <p:nvSpPr>
-          <p:cNvPr id="3" name="Text Placeholder 2"/>
-          <p:cNvSpPr>
-            <a:spLocks noGrp="1"/>
-          </p:cNvSpPr>
-          <p:nvPr>
-            <p:ph type="body" sz="quarter" idx="10"/>
-          </p:nvPr>
+          <p:cNvPr id="5" name="Текстово поле 4">
+            <a:extLst>
+              <a:ext uri="{FF2B5EF4-FFF2-40B4-BE49-F238E27FC236}">
+                <a16:creationId xmlns:a16="http://schemas.microsoft.com/office/drawing/2014/main" id="{CD4EAC60-A5C5-431D-9603-8159F436AD12}"/>
+              </a:ext>
+            </a:extLst>
+          </p:cNvPr>
+          <p:cNvSpPr txBox="1"/>
+          <p:nvPr/>
         </p:nvSpPr>
         <p:spPr>
           <a:xfrm>
-            <a:off x="1529384" y="6400802"/>
-            <a:ext cx="10482604" cy="351754"/>
+            <a:off x="972796" y="6462035"/>
+            <a:ext cx="11216029" cy="369332"/>
           </a:xfrm>
+          <a:prstGeom prst="rect">
+            <a:avLst/>
+          </a:prstGeom>
+          <a:noFill/>
         </p:spPr>
         <p:txBody>
-          <a:bodyPr/>
+          <a:bodyPr wrap="square" rtlCol="0">
+            <a:spAutoFit/>
+          </a:bodyPr>
           <a:lstStyle/>
           <a:p>
             <a:r>
-              <a:rPr lang="en-US" dirty="0">
+              <a:rPr lang="en-US" sz="1800" b="1" dirty="0">
                 <a:hlinkClick r:id="rId3"/>
               </a:rPr>
-              <a:t>https://it-kariera.mon.bg/e-learning/</a:t>
-            </a:r>
-            <a:endParaRPr lang="en-US" dirty="0"/>
+              <a:t>https://github.com/BG-IT-Edu/School-Programming/tree/main/Courses/Applied-Programmer/Programming-Basics</a:t>
+            </a:r>
+            <a:endParaRPr lang="bg-BG" sz="1800" b="1" dirty="0"/>
           </a:p>
         </p:txBody>
       </p:sp>
@@ -5800,6 +5974,258 @@
   <p:clrMapOvr>
     <a:masterClrMapping/>
   </p:clrMapOvr>
+  <p:timing>
+    <p:tnLst>
+      <p:par>
+        <p:cTn id="1" dur="indefinite" restart="never" nodeType="tmRoot">
+          <p:childTnLst>
+            <p:seq concurrent="1" nextAc="seek">
+              <p:cTn id="2" dur="indefinite" nodeType="mainSeq">
+                <p:childTnLst>
+                  <p:par>
+                    <p:cTn id="3" fill="hold">
+                      <p:stCondLst>
+                        <p:cond delay="indefinite"/>
+                      </p:stCondLst>
+                      <p:childTnLst>
+                        <p:par>
+                          <p:cTn id="4" fill="hold">
+                            <p:stCondLst>
+                              <p:cond delay="0"/>
+                            </p:stCondLst>
+                            <p:childTnLst>
+                              <p:par>
+                                <p:cTn id="5" presetID="1" presetClass="entr" presetSubtype="0" fill="hold" nodeType="clickEffect">
+                                  <p:stCondLst>
+                                    <p:cond delay="0"/>
+                                  </p:stCondLst>
+                                  <p:childTnLst>
+                                    <p:set>
+                                      <p:cBhvr>
+                                        <p:cTn id="6" dur="1" fill="hold">
+                                          <p:stCondLst>
+                                            <p:cond delay="0"/>
+                                          </p:stCondLst>
+                                        </p:cTn>
+                                        <p:tgtEl>
+                                          <p:spTgt spid="460805">
+                                            <p:txEl>
+                                              <p:pRg st="1" end="1"/>
+                                            </p:txEl>
+                                          </p:spTgt>
+                                        </p:tgtEl>
+                                        <p:attrNameLst>
+                                          <p:attrName>style.visibility</p:attrName>
+                                        </p:attrNameLst>
+                                      </p:cBhvr>
+                                      <p:to>
+                                        <p:strVal val="visible"/>
+                                      </p:to>
+                                    </p:set>
+                                  </p:childTnLst>
+                                </p:cTn>
+                              </p:par>
+                              <p:par>
+                                <p:cTn id="7" presetID="1" presetClass="entr" presetSubtype="0" fill="hold" nodeType="withEffect">
+                                  <p:stCondLst>
+                                    <p:cond delay="0"/>
+                                  </p:stCondLst>
+                                  <p:childTnLst>
+                                    <p:set>
+                                      <p:cBhvr>
+                                        <p:cTn id="8" dur="1" fill="hold">
+                                          <p:stCondLst>
+                                            <p:cond delay="0"/>
+                                          </p:stCondLst>
+                                        </p:cTn>
+                                        <p:tgtEl>
+                                          <p:spTgt spid="460805">
+                                            <p:txEl>
+                                              <p:pRg st="2" end="2"/>
+                                            </p:txEl>
+                                          </p:spTgt>
+                                        </p:tgtEl>
+                                        <p:attrNameLst>
+                                          <p:attrName>style.visibility</p:attrName>
+                                        </p:attrNameLst>
+                                      </p:cBhvr>
+                                      <p:to>
+                                        <p:strVal val="visible"/>
+                                      </p:to>
+                                    </p:set>
+                                  </p:childTnLst>
+                                </p:cTn>
+                              </p:par>
+                              <p:par>
+                                <p:cTn id="9" presetID="1" presetClass="entr" presetSubtype="0" fill="hold" nodeType="withEffect">
+                                  <p:stCondLst>
+                                    <p:cond delay="0"/>
+                                  </p:stCondLst>
+                                  <p:childTnLst>
+                                    <p:set>
+                                      <p:cBhvr>
+                                        <p:cTn id="10" dur="1" fill="hold">
+                                          <p:stCondLst>
+                                            <p:cond delay="0"/>
+                                          </p:stCondLst>
+                                        </p:cTn>
+                                        <p:tgtEl>
+                                          <p:spTgt spid="460805">
+                                            <p:txEl>
+                                              <p:pRg st="3" end="3"/>
+                                            </p:txEl>
+                                          </p:spTgt>
+                                        </p:tgtEl>
+                                        <p:attrNameLst>
+                                          <p:attrName>style.visibility</p:attrName>
+                                        </p:attrNameLst>
+                                      </p:cBhvr>
+                                      <p:to>
+                                        <p:strVal val="visible"/>
+                                      </p:to>
+                                    </p:set>
+                                  </p:childTnLst>
+                                </p:cTn>
+                              </p:par>
+                            </p:childTnLst>
+                          </p:cTn>
+                        </p:par>
+                      </p:childTnLst>
+                    </p:cTn>
+                  </p:par>
+                  <p:par>
+                    <p:cTn id="11" fill="hold">
+                      <p:stCondLst>
+                        <p:cond delay="indefinite"/>
+                      </p:stCondLst>
+                      <p:childTnLst>
+                        <p:par>
+                          <p:cTn id="12" fill="hold">
+                            <p:stCondLst>
+                              <p:cond delay="0"/>
+                            </p:stCondLst>
+                            <p:childTnLst>
+                              <p:par>
+                                <p:cTn id="13" presetID="1" presetClass="entr" presetSubtype="0" fill="hold" nodeType="clickEffect">
+                                  <p:stCondLst>
+                                    <p:cond delay="0"/>
+                                  </p:stCondLst>
+                                  <p:childTnLst>
+                                    <p:set>
+                                      <p:cBhvr>
+                                        <p:cTn id="14" dur="1" fill="hold">
+                                          <p:stCondLst>
+                                            <p:cond delay="0"/>
+                                          </p:stCondLst>
+                                        </p:cTn>
+                                        <p:tgtEl>
+                                          <p:spTgt spid="460805">
+                                            <p:txEl>
+                                              <p:pRg st="4" end="4"/>
+                                            </p:txEl>
+                                          </p:spTgt>
+                                        </p:tgtEl>
+                                        <p:attrNameLst>
+                                          <p:attrName>style.visibility</p:attrName>
+                                        </p:attrNameLst>
+                                      </p:cBhvr>
+                                      <p:to>
+                                        <p:strVal val="visible"/>
+                                      </p:to>
+                                    </p:set>
+                                  </p:childTnLst>
+                                </p:cTn>
+                              </p:par>
+                              <p:par>
+                                <p:cTn id="15" presetID="1" presetClass="entr" presetSubtype="0" fill="hold" nodeType="withEffect">
+                                  <p:stCondLst>
+                                    <p:cond delay="0"/>
+                                  </p:stCondLst>
+                                  <p:childTnLst>
+                                    <p:set>
+                                      <p:cBhvr>
+                                        <p:cTn id="16" dur="1" fill="hold">
+                                          <p:stCondLst>
+                                            <p:cond delay="0"/>
+                                          </p:stCondLst>
+                                        </p:cTn>
+                                        <p:tgtEl>
+                                          <p:spTgt spid="460805">
+                                            <p:txEl>
+                                              <p:pRg st="5" end="5"/>
+                                            </p:txEl>
+                                          </p:spTgt>
+                                        </p:tgtEl>
+                                        <p:attrNameLst>
+                                          <p:attrName>style.visibility</p:attrName>
+                                        </p:attrNameLst>
+                                      </p:cBhvr>
+                                      <p:to>
+                                        <p:strVal val="visible"/>
+                                      </p:to>
+                                    </p:set>
+                                  </p:childTnLst>
+                                </p:cTn>
+                              </p:par>
+                              <p:par>
+                                <p:cTn id="17" presetID="1" presetClass="entr" presetSubtype="0" fill="hold" nodeType="withEffect">
+                                  <p:stCondLst>
+                                    <p:cond delay="0"/>
+                                  </p:stCondLst>
+                                  <p:childTnLst>
+                                    <p:set>
+                                      <p:cBhvr>
+                                        <p:cTn id="18" dur="1" fill="hold">
+                                          <p:stCondLst>
+                                            <p:cond delay="0"/>
+                                          </p:stCondLst>
+                                        </p:cTn>
+                                        <p:tgtEl>
+                                          <p:spTgt spid="460805">
+                                            <p:txEl>
+                                              <p:pRg st="6" end="6"/>
+                                            </p:txEl>
+                                          </p:spTgt>
+                                        </p:tgtEl>
+                                        <p:attrNameLst>
+                                          <p:attrName>style.visibility</p:attrName>
+                                        </p:attrNameLst>
+                                      </p:cBhvr>
+                                      <p:to>
+                                        <p:strVal val="visible"/>
+                                      </p:to>
+                                    </p:set>
+                                  </p:childTnLst>
+                                </p:cTn>
+                              </p:par>
+                            </p:childTnLst>
+                          </p:cTn>
+                        </p:par>
+                      </p:childTnLst>
+                    </p:cTn>
+                  </p:par>
+                </p:childTnLst>
+              </p:cTn>
+              <p:prevCondLst>
+                <p:cond evt="onPrev" delay="0">
+                  <p:tgtEl>
+                    <p:sldTgt/>
+                  </p:tgtEl>
+                </p:cond>
+              </p:prevCondLst>
+              <p:nextCondLst>
+                <p:cond evt="onNext" delay="0">
+                  <p:tgtEl>
+                    <p:sldTgt/>
+                  </p:tgtEl>
+                </p:cond>
+              </p:nextCondLst>
+            </p:seq>
+          </p:childTnLst>
+        </p:cTn>
+      </p:par>
+    </p:tnLst>
+  </p:timing>
 </p:sld>
 </file>
 
@@ -6343,6 +6769,192 @@
   <p:clrMapOvr>
     <a:masterClrMapping/>
   </p:clrMapOvr>
+  <p:timing>
+    <p:tnLst>
+      <p:par>
+        <p:cTn id="1" dur="indefinite" restart="never" nodeType="tmRoot">
+          <p:childTnLst>
+            <p:seq concurrent="1" nextAc="seek">
+              <p:cTn id="2" dur="indefinite" nodeType="mainSeq">
+                <p:childTnLst>
+                  <p:par>
+                    <p:cTn id="3" fill="hold">
+                      <p:stCondLst>
+                        <p:cond delay="indefinite"/>
+                      </p:stCondLst>
+                      <p:childTnLst>
+                        <p:par>
+                          <p:cTn id="4" fill="hold">
+                            <p:stCondLst>
+                              <p:cond delay="0"/>
+                            </p:stCondLst>
+                            <p:childTnLst>
+                              <p:par>
+                                <p:cTn id="5" presetID="1" presetClass="entr" presetSubtype="0" fill="hold" nodeType="clickEffect">
+                                  <p:stCondLst>
+                                    <p:cond delay="0"/>
+                                  </p:stCondLst>
+                                  <p:childTnLst>
+                                    <p:set>
+                                      <p:cBhvr>
+                                        <p:cTn id="6" dur="1" fill="hold">
+                                          <p:stCondLst>
+                                            <p:cond delay="0"/>
+                                          </p:stCondLst>
+                                        </p:cTn>
+                                        <p:tgtEl>
+                                          <p:spTgt spid="15">
+                                            <p:txEl>
+                                              <p:pRg st="2" end="2"/>
+                                            </p:txEl>
+                                          </p:spTgt>
+                                        </p:tgtEl>
+                                        <p:attrNameLst>
+                                          <p:attrName>style.visibility</p:attrName>
+                                        </p:attrNameLst>
+                                      </p:cBhvr>
+                                      <p:to>
+                                        <p:strVal val="visible"/>
+                                      </p:to>
+                                    </p:set>
+                                  </p:childTnLst>
+                                </p:cTn>
+                              </p:par>
+                              <p:par>
+                                <p:cTn id="7" presetID="1" presetClass="entr" presetSubtype="0" fill="hold" grpId="0" nodeType="withEffect">
+                                  <p:stCondLst>
+                                    <p:cond delay="0"/>
+                                  </p:stCondLst>
+                                  <p:childTnLst>
+                                    <p:set>
+                                      <p:cBhvr>
+                                        <p:cTn id="8" dur="1" fill="hold">
+                                          <p:stCondLst>
+                                            <p:cond delay="0"/>
+                                          </p:stCondLst>
+                                        </p:cTn>
+                                        <p:tgtEl>
+                                          <p:spTgt spid="5"/>
+                                        </p:tgtEl>
+                                        <p:attrNameLst>
+                                          <p:attrName>style.visibility</p:attrName>
+                                        </p:attrNameLst>
+                                      </p:cBhvr>
+                                      <p:to>
+                                        <p:strVal val="visible"/>
+                                      </p:to>
+                                    </p:set>
+                                  </p:childTnLst>
+                                </p:cTn>
+                              </p:par>
+                            </p:childTnLst>
+                          </p:cTn>
+                        </p:par>
+                      </p:childTnLst>
+                    </p:cTn>
+                  </p:par>
+                  <p:par>
+                    <p:cTn id="9" fill="hold">
+                      <p:stCondLst>
+                        <p:cond delay="indefinite"/>
+                      </p:stCondLst>
+                      <p:childTnLst>
+                        <p:par>
+                          <p:cTn id="10" fill="hold">
+                            <p:stCondLst>
+                              <p:cond delay="0"/>
+                            </p:stCondLst>
+                            <p:childTnLst>
+                              <p:par>
+                                <p:cTn id="11" presetID="1" presetClass="entr" presetSubtype="0" fill="hold" nodeType="clickEffect">
+                                  <p:stCondLst>
+                                    <p:cond delay="0"/>
+                                  </p:stCondLst>
+                                  <p:childTnLst>
+                                    <p:set>
+                                      <p:cBhvr>
+                                        <p:cTn id="12" dur="1" fill="hold">
+                                          <p:stCondLst>
+                                            <p:cond delay="0"/>
+                                          </p:stCondLst>
+                                        </p:cTn>
+                                        <p:tgtEl>
+                                          <p:spTgt spid="15">
+                                            <p:txEl>
+                                              <p:pRg st="5" end="5"/>
+                                            </p:txEl>
+                                          </p:spTgt>
+                                        </p:tgtEl>
+                                        <p:attrNameLst>
+                                          <p:attrName>style.visibility</p:attrName>
+                                        </p:attrNameLst>
+                                      </p:cBhvr>
+                                      <p:to>
+                                        <p:strVal val="visible"/>
+                                      </p:to>
+                                    </p:set>
+                                  </p:childTnLst>
+                                </p:cTn>
+                              </p:par>
+                              <p:par>
+                                <p:cTn id="13" presetID="1" presetClass="entr" presetSubtype="0" fill="hold" grpId="0" nodeType="withEffect">
+                                  <p:stCondLst>
+                                    <p:cond delay="0"/>
+                                  </p:stCondLst>
+                                  <p:childTnLst>
+                                    <p:set>
+                                      <p:cBhvr>
+                                        <p:cTn id="14" dur="1" fill="hold">
+                                          <p:stCondLst>
+                                            <p:cond delay="0"/>
+                                          </p:stCondLst>
+                                        </p:cTn>
+                                        <p:tgtEl>
+                                          <p:spTgt spid="10"/>
+                                        </p:tgtEl>
+                                        <p:attrNameLst>
+                                          <p:attrName>style.visibility</p:attrName>
+                                        </p:attrNameLst>
+                                      </p:cBhvr>
+                                      <p:to>
+                                        <p:strVal val="visible"/>
+                                      </p:to>
+                                    </p:set>
+                                  </p:childTnLst>
+                                </p:cTn>
+                              </p:par>
+                            </p:childTnLst>
+                          </p:cTn>
+                        </p:par>
+                      </p:childTnLst>
+                    </p:cTn>
+                  </p:par>
+                </p:childTnLst>
+              </p:cTn>
+              <p:prevCondLst>
+                <p:cond evt="onPrev" delay="0">
+                  <p:tgtEl>
+                    <p:sldTgt/>
+                  </p:tgtEl>
+                </p:cond>
+              </p:prevCondLst>
+              <p:nextCondLst>
+                <p:cond evt="onNext" delay="0">
+                  <p:tgtEl>
+                    <p:sldTgt/>
+                  </p:tgtEl>
+                </p:cond>
+              </p:nextCondLst>
+            </p:seq>
+          </p:childTnLst>
+        </p:cTn>
+      </p:par>
+    </p:tnLst>
+    <p:bldLst>
+      <p:bldP spid="5" grpId="0" animBg="1"/>
+      <p:bldP spid="10" grpId="0" animBg="1"/>
+    </p:bldLst>
+  </p:timing>
 </p:sld>
 </file>
 
@@ -6655,6 +7267,276 @@
   <p:clrMapOvr>
     <a:masterClrMapping/>
   </p:clrMapOvr>
+  <p:timing>
+    <p:tnLst>
+      <p:par>
+        <p:cTn id="1" dur="indefinite" restart="never" nodeType="tmRoot">
+          <p:childTnLst>
+            <p:seq concurrent="1" nextAc="seek">
+              <p:cTn id="2" dur="indefinite" nodeType="mainSeq">
+                <p:childTnLst>
+                  <p:par>
+                    <p:cTn id="3" fill="hold">
+                      <p:stCondLst>
+                        <p:cond delay="indefinite"/>
+                      </p:stCondLst>
+                      <p:childTnLst>
+                        <p:par>
+                          <p:cTn id="4" fill="hold">
+                            <p:stCondLst>
+                              <p:cond delay="0"/>
+                            </p:stCondLst>
+                            <p:childTnLst>
+                              <p:par>
+                                <p:cTn id="5" presetID="1" presetClass="entr" presetSubtype="0" fill="hold" nodeType="clickEffect">
+                                  <p:stCondLst>
+                                    <p:cond delay="0"/>
+                                  </p:stCondLst>
+                                  <p:childTnLst>
+                                    <p:set>
+                                      <p:cBhvr>
+                                        <p:cTn id="6" dur="1" fill="hold">
+                                          <p:stCondLst>
+                                            <p:cond delay="0"/>
+                                          </p:stCondLst>
+                                        </p:cTn>
+                                        <p:tgtEl>
+                                          <p:spTgt spid="3">
+                                            <p:txEl>
+                                              <p:pRg st="2" end="2"/>
+                                            </p:txEl>
+                                          </p:spTgt>
+                                        </p:tgtEl>
+                                        <p:attrNameLst>
+                                          <p:attrName>style.visibility</p:attrName>
+                                        </p:attrNameLst>
+                                      </p:cBhvr>
+                                      <p:to>
+                                        <p:strVal val="visible"/>
+                                      </p:to>
+                                    </p:set>
+                                  </p:childTnLst>
+                                </p:cTn>
+                              </p:par>
+                              <p:par>
+                                <p:cTn id="7" presetID="1" presetClass="entr" presetSubtype="0" fill="hold" nodeType="withEffect">
+                                  <p:stCondLst>
+                                    <p:cond delay="0"/>
+                                  </p:stCondLst>
+                                  <p:childTnLst>
+                                    <p:set>
+                                      <p:cBhvr>
+                                        <p:cTn id="8" dur="1" fill="hold">
+                                          <p:stCondLst>
+                                            <p:cond delay="0"/>
+                                          </p:stCondLst>
+                                        </p:cTn>
+                                        <p:tgtEl>
+                                          <p:spTgt spid="3">
+                                            <p:txEl>
+                                              <p:pRg st="3" end="3"/>
+                                            </p:txEl>
+                                          </p:spTgt>
+                                        </p:tgtEl>
+                                        <p:attrNameLst>
+                                          <p:attrName>style.visibility</p:attrName>
+                                        </p:attrNameLst>
+                                      </p:cBhvr>
+                                      <p:to>
+                                        <p:strVal val="visible"/>
+                                      </p:to>
+                                    </p:set>
+                                  </p:childTnLst>
+                                </p:cTn>
+                              </p:par>
+                            </p:childTnLst>
+                          </p:cTn>
+                        </p:par>
+                      </p:childTnLst>
+                    </p:cTn>
+                  </p:par>
+                  <p:par>
+                    <p:cTn id="9" fill="hold">
+                      <p:stCondLst>
+                        <p:cond delay="indefinite"/>
+                      </p:stCondLst>
+                      <p:childTnLst>
+                        <p:par>
+                          <p:cTn id="10" fill="hold">
+                            <p:stCondLst>
+                              <p:cond delay="0"/>
+                            </p:stCondLst>
+                            <p:childTnLst>
+                              <p:par>
+                                <p:cTn id="11" presetID="1" presetClass="entr" presetSubtype="0" fill="hold" nodeType="clickEffect">
+                                  <p:stCondLst>
+                                    <p:cond delay="0"/>
+                                  </p:stCondLst>
+                                  <p:childTnLst>
+                                    <p:set>
+                                      <p:cBhvr>
+                                        <p:cTn id="12" dur="1" fill="hold">
+                                          <p:stCondLst>
+                                            <p:cond delay="0"/>
+                                          </p:stCondLst>
+                                        </p:cTn>
+                                        <p:tgtEl>
+                                          <p:spTgt spid="3">
+                                            <p:txEl>
+                                              <p:pRg st="4" end="4"/>
+                                            </p:txEl>
+                                          </p:spTgt>
+                                        </p:tgtEl>
+                                        <p:attrNameLst>
+                                          <p:attrName>style.visibility</p:attrName>
+                                        </p:attrNameLst>
+                                      </p:cBhvr>
+                                      <p:to>
+                                        <p:strVal val="visible"/>
+                                      </p:to>
+                                    </p:set>
+                                  </p:childTnLst>
+                                </p:cTn>
+                              </p:par>
+                              <p:par>
+                                <p:cTn id="13" presetID="1" presetClass="entr" presetSubtype="0" fill="hold" nodeType="withEffect">
+                                  <p:stCondLst>
+                                    <p:cond delay="0"/>
+                                  </p:stCondLst>
+                                  <p:childTnLst>
+                                    <p:set>
+                                      <p:cBhvr>
+                                        <p:cTn id="14" dur="1" fill="hold">
+                                          <p:stCondLst>
+                                            <p:cond delay="0"/>
+                                          </p:stCondLst>
+                                        </p:cTn>
+                                        <p:tgtEl>
+                                          <p:spTgt spid="3">
+                                            <p:txEl>
+                                              <p:pRg st="5" end="5"/>
+                                            </p:txEl>
+                                          </p:spTgt>
+                                        </p:tgtEl>
+                                        <p:attrNameLst>
+                                          <p:attrName>style.visibility</p:attrName>
+                                        </p:attrNameLst>
+                                      </p:cBhvr>
+                                      <p:to>
+                                        <p:strVal val="visible"/>
+                                      </p:to>
+                                    </p:set>
+                                  </p:childTnLst>
+                                </p:cTn>
+                              </p:par>
+                            </p:childTnLst>
+                          </p:cTn>
+                        </p:par>
+                      </p:childTnLst>
+                    </p:cTn>
+                  </p:par>
+                  <p:par>
+                    <p:cTn id="15" fill="hold">
+                      <p:stCondLst>
+                        <p:cond delay="indefinite"/>
+                      </p:stCondLst>
+                      <p:childTnLst>
+                        <p:par>
+                          <p:cTn id="16" fill="hold">
+                            <p:stCondLst>
+                              <p:cond delay="0"/>
+                            </p:stCondLst>
+                            <p:childTnLst>
+                              <p:par>
+                                <p:cTn id="17" presetID="1" presetClass="entr" presetSubtype="0" fill="hold" nodeType="clickEffect">
+                                  <p:stCondLst>
+                                    <p:cond delay="0"/>
+                                  </p:stCondLst>
+                                  <p:childTnLst>
+                                    <p:set>
+                                      <p:cBhvr>
+                                        <p:cTn id="18" dur="1" fill="hold">
+                                          <p:stCondLst>
+                                            <p:cond delay="0"/>
+                                          </p:stCondLst>
+                                        </p:cTn>
+                                        <p:tgtEl>
+                                          <p:spTgt spid="3">
+                                            <p:txEl>
+                                              <p:pRg st="6" end="6"/>
+                                            </p:txEl>
+                                          </p:spTgt>
+                                        </p:tgtEl>
+                                        <p:attrNameLst>
+                                          <p:attrName>style.visibility</p:attrName>
+                                        </p:attrNameLst>
+                                      </p:cBhvr>
+                                      <p:to>
+                                        <p:strVal val="visible"/>
+                                      </p:to>
+                                    </p:set>
+                                  </p:childTnLst>
+                                </p:cTn>
+                              </p:par>
+                              <p:par>
+                                <p:cTn id="19" presetID="1" presetClass="entr" presetSubtype="0" fill="hold" nodeType="withEffect">
+                                  <p:stCondLst>
+                                    <p:cond delay="0"/>
+                                  </p:stCondLst>
+                                  <p:childTnLst>
+                                    <p:set>
+                                      <p:cBhvr>
+                                        <p:cTn id="20" dur="1" fill="hold">
+                                          <p:stCondLst>
+                                            <p:cond delay="0"/>
+                                          </p:stCondLst>
+                                        </p:cTn>
+                                        <p:tgtEl>
+                                          <p:spTgt spid="3">
+                                            <p:txEl>
+                                              <p:pRg st="7" end="7"/>
+                                            </p:txEl>
+                                          </p:spTgt>
+                                        </p:tgtEl>
+                                        <p:attrNameLst>
+                                          <p:attrName>style.visibility</p:attrName>
+                                        </p:attrNameLst>
+                                      </p:cBhvr>
+                                      <p:to>
+                                        <p:strVal val="visible"/>
+                                      </p:to>
+                                    </p:set>
+                                  </p:childTnLst>
+                                </p:cTn>
+                              </p:par>
+                            </p:childTnLst>
+                          </p:cTn>
+                        </p:par>
+                      </p:childTnLst>
+                    </p:cTn>
+                  </p:par>
+                </p:childTnLst>
+              </p:cTn>
+              <p:prevCondLst>
+                <p:cond evt="onPrev" delay="0">
+                  <p:tgtEl>
+                    <p:sldTgt/>
+                  </p:tgtEl>
+                </p:cond>
+              </p:prevCondLst>
+              <p:nextCondLst>
+                <p:cond evt="onNext" delay="0">
+                  <p:tgtEl>
+                    <p:sldTgt/>
+                  </p:tgtEl>
+                </p:cond>
+              </p:nextCondLst>
+            </p:seq>
+          </p:childTnLst>
+        </p:cTn>
+      </p:par>
+    </p:tnLst>
+  </p:timing>
 </p:sld>
 </file>
 
@@ -6931,6 +7813,294 @@
   <p:clrMapOvr>
     <a:masterClrMapping/>
   </p:clrMapOvr>
+  <p:timing>
+    <p:tnLst>
+      <p:par>
+        <p:cTn id="1" dur="indefinite" restart="never" nodeType="tmRoot">
+          <p:childTnLst>
+            <p:seq concurrent="1" nextAc="seek">
+              <p:cTn id="2" dur="indefinite" nodeType="mainSeq">
+                <p:childTnLst>
+                  <p:par>
+                    <p:cTn id="3" fill="hold">
+                      <p:stCondLst>
+                        <p:cond delay="indefinite"/>
+                      </p:stCondLst>
+                      <p:childTnLst>
+                        <p:par>
+                          <p:cTn id="4" fill="hold">
+                            <p:stCondLst>
+                              <p:cond delay="0"/>
+                            </p:stCondLst>
+                            <p:childTnLst>
+                              <p:par>
+                                <p:cTn id="5" presetID="1" presetClass="entr" presetSubtype="0" fill="hold" nodeType="clickEffect">
+                                  <p:stCondLst>
+                                    <p:cond delay="0"/>
+                                  </p:stCondLst>
+                                  <p:childTnLst>
+                                    <p:set>
+                                      <p:cBhvr>
+                                        <p:cTn id="6" dur="1" fill="hold">
+                                          <p:stCondLst>
+                                            <p:cond delay="0"/>
+                                          </p:stCondLst>
+                                        </p:cTn>
+                                        <p:tgtEl>
+                                          <p:spTgt spid="3">
+                                            <p:txEl>
+                                              <p:pRg st="1" end="1"/>
+                                            </p:txEl>
+                                          </p:spTgt>
+                                        </p:tgtEl>
+                                        <p:attrNameLst>
+                                          <p:attrName>style.visibility</p:attrName>
+                                        </p:attrNameLst>
+                                      </p:cBhvr>
+                                      <p:to>
+                                        <p:strVal val="visible"/>
+                                      </p:to>
+                                    </p:set>
+                                  </p:childTnLst>
+                                </p:cTn>
+                              </p:par>
+                            </p:childTnLst>
+                          </p:cTn>
+                        </p:par>
+                      </p:childTnLst>
+                    </p:cTn>
+                  </p:par>
+                  <p:par>
+                    <p:cTn id="7" fill="hold">
+                      <p:stCondLst>
+                        <p:cond delay="indefinite"/>
+                      </p:stCondLst>
+                      <p:childTnLst>
+                        <p:par>
+                          <p:cTn id="8" fill="hold">
+                            <p:stCondLst>
+                              <p:cond delay="0"/>
+                            </p:stCondLst>
+                            <p:childTnLst>
+                              <p:par>
+                                <p:cTn id="9" presetID="1" presetClass="entr" presetSubtype="0" fill="hold" nodeType="clickEffect">
+                                  <p:stCondLst>
+                                    <p:cond delay="0"/>
+                                  </p:stCondLst>
+                                  <p:childTnLst>
+                                    <p:set>
+                                      <p:cBhvr>
+                                        <p:cTn id="10" dur="1" fill="hold">
+                                          <p:stCondLst>
+                                            <p:cond delay="0"/>
+                                          </p:stCondLst>
+                                        </p:cTn>
+                                        <p:tgtEl>
+                                          <p:spTgt spid="3">
+                                            <p:txEl>
+                                              <p:pRg st="2" end="2"/>
+                                            </p:txEl>
+                                          </p:spTgt>
+                                        </p:tgtEl>
+                                        <p:attrNameLst>
+                                          <p:attrName>style.visibility</p:attrName>
+                                        </p:attrNameLst>
+                                      </p:cBhvr>
+                                      <p:to>
+                                        <p:strVal val="visible"/>
+                                      </p:to>
+                                    </p:set>
+                                  </p:childTnLst>
+                                </p:cTn>
+                              </p:par>
+                              <p:par>
+                                <p:cTn id="11" presetID="1" presetClass="entr" presetSubtype="0" fill="hold" nodeType="withEffect">
+                                  <p:stCondLst>
+                                    <p:cond delay="0"/>
+                                  </p:stCondLst>
+                                  <p:childTnLst>
+                                    <p:set>
+                                      <p:cBhvr>
+                                        <p:cTn id="12" dur="1" fill="hold">
+                                          <p:stCondLst>
+                                            <p:cond delay="0"/>
+                                          </p:stCondLst>
+                                        </p:cTn>
+                                        <p:tgtEl>
+                                          <p:spTgt spid="3">
+                                            <p:txEl>
+                                              <p:pRg st="3" end="3"/>
+                                            </p:txEl>
+                                          </p:spTgt>
+                                        </p:tgtEl>
+                                        <p:attrNameLst>
+                                          <p:attrName>style.visibility</p:attrName>
+                                        </p:attrNameLst>
+                                      </p:cBhvr>
+                                      <p:to>
+                                        <p:strVal val="visible"/>
+                                      </p:to>
+                                    </p:set>
+                                  </p:childTnLst>
+                                </p:cTn>
+                              </p:par>
+                              <p:par>
+                                <p:cTn id="13" presetID="1" presetClass="entr" presetSubtype="0" fill="hold" nodeType="withEffect">
+                                  <p:stCondLst>
+                                    <p:cond delay="0"/>
+                                  </p:stCondLst>
+                                  <p:childTnLst>
+                                    <p:set>
+                                      <p:cBhvr>
+                                        <p:cTn id="14" dur="1" fill="hold">
+                                          <p:stCondLst>
+                                            <p:cond delay="0"/>
+                                          </p:stCondLst>
+                                        </p:cTn>
+                                        <p:tgtEl>
+                                          <p:spTgt spid="3">
+                                            <p:txEl>
+                                              <p:pRg st="4" end="4"/>
+                                            </p:txEl>
+                                          </p:spTgt>
+                                        </p:tgtEl>
+                                        <p:attrNameLst>
+                                          <p:attrName>style.visibility</p:attrName>
+                                        </p:attrNameLst>
+                                      </p:cBhvr>
+                                      <p:to>
+                                        <p:strVal val="visible"/>
+                                      </p:to>
+                                    </p:set>
+                                  </p:childTnLst>
+                                </p:cTn>
+                              </p:par>
+                            </p:childTnLst>
+                          </p:cTn>
+                        </p:par>
+                      </p:childTnLst>
+                    </p:cTn>
+                  </p:par>
+                  <p:par>
+                    <p:cTn id="15" fill="hold">
+                      <p:stCondLst>
+                        <p:cond delay="indefinite"/>
+                      </p:stCondLst>
+                      <p:childTnLst>
+                        <p:par>
+                          <p:cTn id="16" fill="hold">
+                            <p:stCondLst>
+                              <p:cond delay="0"/>
+                            </p:stCondLst>
+                            <p:childTnLst>
+                              <p:par>
+                                <p:cTn id="17" presetID="1" presetClass="entr" presetSubtype="0" fill="hold" nodeType="clickEffect">
+                                  <p:stCondLst>
+                                    <p:cond delay="0"/>
+                                  </p:stCondLst>
+                                  <p:childTnLst>
+                                    <p:set>
+                                      <p:cBhvr>
+                                        <p:cTn id="18" dur="1" fill="hold">
+                                          <p:stCondLst>
+                                            <p:cond delay="0"/>
+                                          </p:stCondLst>
+                                        </p:cTn>
+                                        <p:tgtEl>
+                                          <p:spTgt spid="3">
+                                            <p:txEl>
+                                              <p:pRg st="5" end="5"/>
+                                            </p:txEl>
+                                          </p:spTgt>
+                                        </p:tgtEl>
+                                        <p:attrNameLst>
+                                          <p:attrName>style.visibility</p:attrName>
+                                        </p:attrNameLst>
+                                      </p:cBhvr>
+                                      <p:to>
+                                        <p:strVal val="visible"/>
+                                      </p:to>
+                                    </p:set>
+                                  </p:childTnLst>
+                                </p:cTn>
+                              </p:par>
+                            </p:childTnLst>
+                          </p:cTn>
+                        </p:par>
+                      </p:childTnLst>
+                    </p:cTn>
+                  </p:par>
+                  <p:par>
+                    <p:cTn id="19" fill="hold">
+                      <p:stCondLst>
+                        <p:cond delay="indefinite"/>
+                      </p:stCondLst>
+                      <p:childTnLst>
+                        <p:par>
+                          <p:cTn id="20" fill="hold">
+                            <p:stCondLst>
+                              <p:cond delay="0"/>
+                            </p:stCondLst>
+                            <p:childTnLst>
+                              <p:par>
+                                <p:cTn id="21" presetID="1" presetClass="entr" presetSubtype="0" fill="hold" nodeType="clickEffect">
+                                  <p:stCondLst>
+                                    <p:cond delay="0"/>
+                                  </p:stCondLst>
+                                  <p:childTnLst>
+                                    <p:set>
+                                      <p:cBhvr>
+                                        <p:cTn id="22" dur="1" fill="hold">
+                                          <p:stCondLst>
+                                            <p:cond delay="0"/>
+                                          </p:stCondLst>
+                                        </p:cTn>
+                                        <p:tgtEl>
+                                          <p:spTgt spid="3">
+                                            <p:txEl>
+                                              <p:pRg st="6" end="6"/>
+                                            </p:txEl>
+                                          </p:spTgt>
+                                        </p:tgtEl>
+                                        <p:attrNameLst>
+                                          <p:attrName>style.visibility</p:attrName>
+                                        </p:attrNameLst>
+                                      </p:cBhvr>
+                                      <p:to>
+                                        <p:strVal val="visible"/>
+                                      </p:to>
+                                    </p:set>
+                                  </p:childTnLst>
+                                </p:cTn>
+                              </p:par>
+                            </p:childTnLst>
+                          </p:cTn>
+                        </p:par>
+                      </p:childTnLst>
+                    </p:cTn>
+                  </p:par>
+                </p:childTnLst>
+              </p:cTn>
+              <p:prevCondLst>
+                <p:cond evt="onPrev" delay="0">
+                  <p:tgtEl>
+                    <p:sldTgt/>
+                  </p:tgtEl>
+                </p:cond>
+              </p:prevCondLst>
+              <p:nextCondLst>
+                <p:cond evt="onNext" delay="0">
+                  <p:tgtEl>
+                    <p:sldTgt/>
+                  </p:tgtEl>
+                </p:cond>
+              </p:nextCondLst>
+            </p:seq>
+          </p:childTnLst>
+        </p:cTn>
+      </p:par>
+    </p:tnLst>
+  </p:timing>
 </p:sld>
 </file>
 
@@ -7011,7 +8181,6 @@
               <a:rPr lang="bg-BG" dirty="0"/>
               <a:t>, но не се препоръчва</a:t>
             </a:r>
-            <a:endParaRPr lang="en-US" dirty="0"/>
           </a:p>
           <a:p>
             <a:r>
@@ -7161,6 +8330,245 @@
   <p:clrMapOvr>
     <a:masterClrMapping/>
   </p:clrMapOvr>
+  <p:timing>
+    <p:tnLst>
+      <p:par>
+        <p:cTn id="1" dur="indefinite" restart="never" nodeType="tmRoot">
+          <p:childTnLst>
+            <p:seq concurrent="1" nextAc="seek">
+              <p:cTn id="2" dur="indefinite" nodeType="mainSeq">
+                <p:childTnLst>
+                  <p:par>
+                    <p:cTn id="3" fill="hold">
+                      <p:stCondLst>
+                        <p:cond delay="indefinite"/>
+                      </p:stCondLst>
+                      <p:childTnLst>
+                        <p:par>
+                          <p:cTn id="4" fill="hold">
+                            <p:stCondLst>
+                              <p:cond delay="0"/>
+                            </p:stCondLst>
+                            <p:childTnLst>
+                              <p:par>
+                                <p:cTn id="5" presetID="1" presetClass="entr" presetSubtype="0" fill="hold" nodeType="clickEffect">
+                                  <p:stCondLst>
+                                    <p:cond delay="0"/>
+                                  </p:stCondLst>
+                                  <p:childTnLst>
+                                    <p:set>
+                                      <p:cBhvr>
+                                        <p:cTn id="6" dur="1" fill="hold">
+                                          <p:stCondLst>
+                                            <p:cond delay="0"/>
+                                          </p:stCondLst>
+                                        </p:cTn>
+                                        <p:tgtEl>
+                                          <p:spTgt spid="3">
+                                            <p:txEl>
+                                              <p:pRg st="2" end="2"/>
+                                            </p:txEl>
+                                          </p:spTgt>
+                                        </p:tgtEl>
+                                        <p:attrNameLst>
+                                          <p:attrName>style.visibility</p:attrName>
+                                        </p:attrNameLst>
+                                      </p:cBhvr>
+                                      <p:to>
+                                        <p:strVal val="visible"/>
+                                      </p:to>
+                                    </p:set>
+                                  </p:childTnLst>
+                                </p:cTn>
+                              </p:par>
+                            </p:childTnLst>
+                          </p:cTn>
+                        </p:par>
+                      </p:childTnLst>
+                    </p:cTn>
+                  </p:par>
+                  <p:par>
+                    <p:cTn id="7" fill="hold">
+                      <p:stCondLst>
+                        <p:cond delay="indefinite"/>
+                      </p:stCondLst>
+                      <p:childTnLst>
+                        <p:par>
+                          <p:cTn id="8" fill="hold">
+                            <p:stCondLst>
+                              <p:cond delay="0"/>
+                            </p:stCondLst>
+                            <p:childTnLst>
+                              <p:par>
+                                <p:cTn id="9" presetID="1" presetClass="entr" presetSubtype="0" fill="hold" nodeType="clickEffect">
+                                  <p:stCondLst>
+                                    <p:cond delay="0"/>
+                                  </p:stCondLst>
+                                  <p:childTnLst>
+                                    <p:set>
+                                      <p:cBhvr>
+                                        <p:cTn id="10" dur="1" fill="hold">
+                                          <p:stCondLst>
+                                            <p:cond delay="0"/>
+                                          </p:stCondLst>
+                                        </p:cTn>
+                                        <p:tgtEl>
+                                          <p:spTgt spid="3">
+                                            <p:txEl>
+                                              <p:pRg st="3" end="3"/>
+                                            </p:txEl>
+                                          </p:spTgt>
+                                        </p:tgtEl>
+                                        <p:attrNameLst>
+                                          <p:attrName>style.visibility</p:attrName>
+                                        </p:attrNameLst>
+                                      </p:cBhvr>
+                                      <p:to>
+                                        <p:strVal val="visible"/>
+                                      </p:to>
+                                    </p:set>
+                                  </p:childTnLst>
+                                </p:cTn>
+                              </p:par>
+                            </p:childTnLst>
+                          </p:cTn>
+                        </p:par>
+                      </p:childTnLst>
+                    </p:cTn>
+                  </p:par>
+                  <p:par>
+                    <p:cTn id="11" fill="hold">
+                      <p:stCondLst>
+                        <p:cond delay="indefinite"/>
+                      </p:stCondLst>
+                      <p:childTnLst>
+                        <p:par>
+                          <p:cTn id="12" fill="hold">
+                            <p:stCondLst>
+                              <p:cond delay="0"/>
+                            </p:stCondLst>
+                            <p:childTnLst>
+                              <p:par>
+                                <p:cTn id="13" presetID="1" presetClass="entr" presetSubtype="0" fill="hold" nodeType="clickEffect">
+                                  <p:stCondLst>
+                                    <p:cond delay="0"/>
+                                  </p:stCondLst>
+                                  <p:childTnLst>
+                                    <p:set>
+                                      <p:cBhvr>
+                                        <p:cTn id="14" dur="1" fill="hold">
+                                          <p:stCondLst>
+                                            <p:cond delay="0"/>
+                                          </p:stCondLst>
+                                        </p:cTn>
+                                        <p:tgtEl>
+                                          <p:spTgt spid="3">
+                                            <p:txEl>
+                                              <p:pRg st="4" end="4"/>
+                                            </p:txEl>
+                                          </p:spTgt>
+                                        </p:tgtEl>
+                                        <p:attrNameLst>
+                                          <p:attrName>style.visibility</p:attrName>
+                                        </p:attrNameLst>
+                                      </p:cBhvr>
+                                      <p:to>
+                                        <p:strVal val="visible"/>
+                                      </p:to>
+                                    </p:set>
+                                  </p:childTnLst>
+                                </p:cTn>
+                              </p:par>
+                              <p:par>
+                                <p:cTn id="15" presetID="1" presetClass="entr" presetSubtype="0" fill="hold" nodeType="withEffect">
+                                  <p:stCondLst>
+                                    <p:cond delay="0"/>
+                                  </p:stCondLst>
+                                  <p:childTnLst>
+                                    <p:set>
+                                      <p:cBhvr>
+                                        <p:cTn id="16" dur="1" fill="hold">
+                                          <p:stCondLst>
+                                            <p:cond delay="0"/>
+                                          </p:stCondLst>
+                                        </p:cTn>
+                                        <p:tgtEl>
+                                          <p:spTgt spid="3">
+                                            <p:txEl>
+                                              <p:pRg st="5" end="5"/>
+                                            </p:txEl>
+                                          </p:spTgt>
+                                        </p:tgtEl>
+                                        <p:attrNameLst>
+                                          <p:attrName>style.visibility</p:attrName>
+                                        </p:attrNameLst>
+                                      </p:cBhvr>
+                                      <p:to>
+                                        <p:strVal val="visible"/>
+                                      </p:to>
+                                    </p:set>
+                                  </p:childTnLst>
+                                </p:cTn>
+                              </p:par>
+                              <p:par>
+                                <p:cTn id="17" presetID="1" presetClass="entr" presetSubtype="0" fill="hold" nodeType="withEffect">
+                                  <p:stCondLst>
+                                    <p:cond delay="0"/>
+                                  </p:stCondLst>
+                                  <p:childTnLst>
+                                    <p:set>
+                                      <p:cBhvr>
+                                        <p:cTn id="18" dur="1" fill="hold">
+                                          <p:stCondLst>
+                                            <p:cond delay="0"/>
+                                          </p:stCondLst>
+                                        </p:cTn>
+                                        <p:tgtEl>
+                                          <p:spTgt spid="3">
+                                            <p:txEl>
+                                              <p:pRg st="6" end="6"/>
+                                            </p:txEl>
+                                          </p:spTgt>
+                                        </p:tgtEl>
+                                        <p:attrNameLst>
+                                          <p:attrName>style.visibility</p:attrName>
+                                        </p:attrNameLst>
+                                      </p:cBhvr>
+                                      <p:to>
+                                        <p:strVal val="visible"/>
+                                      </p:to>
+                                    </p:set>
+                                  </p:childTnLst>
+                                </p:cTn>
+                              </p:par>
+                            </p:childTnLst>
+                          </p:cTn>
+                        </p:par>
+                      </p:childTnLst>
+                    </p:cTn>
+                  </p:par>
+                </p:childTnLst>
+              </p:cTn>
+              <p:prevCondLst>
+                <p:cond evt="onPrev" delay="0">
+                  <p:tgtEl>
+                    <p:sldTgt/>
+                  </p:tgtEl>
+                </p:cond>
+              </p:prevCondLst>
+              <p:nextCondLst>
+                <p:cond evt="onNext" delay="0">
+                  <p:tgtEl>
+                    <p:sldTgt/>
+                  </p:tgtEl>
+                </p:cond>
+              </p:nextCondLst>
+            </p:seq>
+          </p:childTnLst>
+        </p:cTn>
+      </p:par>
+    </p:tnLst>
+  </p:timing>
 </p:sld>
 </file>
 
@@ -7816,6 +9224,112 @@
   <p:clrMapOvr>
     <a:masterClrMapping/>
   </p:clrMapOvr>
+  <p:timing>
+    <p:tnLst>
+      <p:par>
+        <p:cTn id="1" dur="indefinite" restart="never" nodeType="tmRoot">
+          <p:childTnLst>
+            <p:seq concurrent="1" nextAc="seek">
+              <p:cTn id="2" dur="indefinite" nodeType="mainSeq">
+                <p:childTnLst>
+                  <p:par>
+                    <p:cTn id="3" fill="hold">
+                      <p:stCondLst>
+                        <p:cond delay="indefinite"/>
+                      </p:stCondLst>
+                      <p:childTnLst>
+                        <p:par>
+                          <p:cTn id="4" fill="hold">
+                            <p:stCondLst>
+                              <p:cond delay="0"/>
+                            </p:stCondLst>
+                            <p:childTnLst>
+                              <p:par>
+                                <p:cTn id="5" presetID="1" presetClass="entr" presetSubtype="0" fill="hold" nodeType="clickEffect">
+                                  <p:stCondLst>
+                                    <p:cond delay="0"/>
+                                  </p:stCondLst>
+                                  <p:childTnLst>
+                                    <p:set>
+                                      <p:cBhvr>
+                                        <p:cTn id="6" dur="1" fill="hold">
+                                          <p:stCondLst>
+                                            <p:cond delay="0"/>
+                                          </p:stCondLst>
+                                        </p:cTn>
+                                        <p:tgtEl>
+                                          <p:spTgt spid="3">
+                                            <p:txEl>
+                                              <p:pRg st="1" end="1"/>
+                                            </p:txEl>
+                                          </p:spTgt>
+                                        </p:tgtEl>
+                                        <p:attrNameLst>
+                                          <p:attrName>style.visibility</p:attrName>
+                                        </p:attrNameLst>
+                                      </p:cBhvr>
+                                      <p:to>
+                                        <p:strVal val="visible"/>
+                                      </p:to>
+                                    </p:set>
+                                  </p:childTnLst>
+                                </p:cTn>
+                              </p:par>
+                              <p:par>
+                                <p:cTn id="7" presetID="1" presetClass="entr" presetSubtype="0" fill="hold" nodeType="withEffect">
+                                  <p:stCondLst>
+                                    <p:cond delay="0"/>
+                                  </p:stCondLst>
+                                  <p:childTnLst>
+                                    <p:set>
+                                      <p:cBhvr>
+                                        <p:cTn id="8" dur="1" fill="hold">
+                                          <p:stCondLst>
+                                            <p:cond delay="0"/>
+                                          </p:stCondLst>
+                                        </p:cTn>
+                                        <p:tgtEl>
+                                          <p:spTgt spid="15"/>
+                                        </p:tgtEl>
+                                        <p:attrNameLst>
+                                          <p:attrName>style.visibility</p:attrName>
+                                        </p:attrNameLst>
+                                      </p:cBhvr>
+                                      <p:to>
+                                        <p:strVal val="visible"/>
+                                      </p:to>
+                                    </p:set>
+                                  </p:childTnLst>
+                                </p:cTn>
+                              </p:par>
+                            </p:childTnLst>
+                          </p:cTn>
+                        </p:par>
+                      </p:childTnLst>
+                    </p:cTn>
+                  </p:par>
+                </p:childTnLst>
+              </p:cTn>
+              <p:prevCondLst>
+                <p:cond evt="onPrev" delay="0">
+                  <p:tgtEl>
+                    <p:sldTgt/>
+                  </p:tgtEl>
+                </p:cond>
+              </p:prevCondLst>
+              <p:nextCondLst>
+                <p:cond evt="onNext" delay="0">
+                  <p:tgtEl>
+                    <p:sldTgt/>
+                  </p:tgtEl>
+                </p:cond>
+              </p:nextCondLst>
+            </p:seq>
+          </p:childTnLst>
+        </p:cTn>
+      </p:par>
+    </p:tnLst>
+  </p:timing>
 </p:sld>
 </file>
 

</xml_diff>